<commit_message>
Code pushed to Main
</commit_message>
<xml_diff>
--- a/Project Presentation.pptx
+++ b/Project Presentation.pptx
@@ -5,7 +5,7 @@
     <p:sldMasterId id="2147483774" r:id="rId1"/>
   </p:sldMasterIdLst>
   <p:notesMasterIdLst>
-    <p:notesMasterId r:id="rId18"/>
+    <p:notesMasterId r:id="rId19"/>
   </p:notesMasterIdLst>
   <p:sldIdLst>
     <p:sldId id="256" r:id="rId2"/>
@@ -19,11 +19,12 @@
     <p:sldId id="285" r:id="rId10"/>
     <p:sldId id="284" r:id="rId11"/>
     <p:sldId id="279" r:id="rId12"/>
-    <p:sldId id="287" r:id="rId13"/>
-    <p:sldId id="288" r:id="rId14"/>
-    <p:sldId id="286" r:id="rId15"/>
-    <p:sldId id="266" r:id="rId16"/>
-    <p:sldId id="265" r:id="rId17"/>
+    <p:sldId id="289" r:id="rId13"/>
+    <p:sldId id="287" r:id="rId14"/>
+    <p:sldId id="288" r:id="rId15"/>
+    <p:sldId id="286" r:id="rId16"/>
+    <p:sldId id="266" r:id="rId17"/>
+    <p:sldId id="265" r:id="rId18"/>
   </p:sldIdLst>
   <p:sldSz cx="12192000" cy="6858000"/>
   <p:notesSz cx="6858000" cy="9144000"/>
@@ -212,7 +213,7 @@
           <a:p>
             <a:fld id="{565C5E63-074E-423D-B88A-A9055DAAD4C3}" type="datetimeFigureOut">
               <a:rPr lang="en-US" smtClean="0"/>
-              <a:t>11/28/2023</a:t>
+              <a:t>12/1/2023</a:t>
             </a:fld>
             <a:endParaRPr lang="en-US"/>
           </a:p>
@@ -882,7 +883,7 @@
           <a:p>
             <a:fld id="{48DEACF2-94AD-4836-A1E9-47B16A2D298E}" type="datetime1">
               <a:rPr lang="en-US" smtClean="0"/>
-              <a:t>11/28/2023</a:t>
+              <a:t>12/1/2023</a:t>
             </a:fld>
             <a:endParaRPr lang="en-US"/>
           </a:p>
@@ -1061,7 +1062,7 @@
           <a:p>
             <a:fld id="{5B3A6A62-0ACB-4119-9129-67E1F5BCC0D9}" type="datetime1">
               <a:rPr lang="en-US" smtClean="0"/>
-              <a:t>11/28/2023</a:t>
+              <a:t>12/1/2023</a:t>
             </a:fld>
             <a:endParaRPr lang="en-US"/>
           </a:p>
@@ -1241,7 +1242,7 @@
           <a:p>
             <a:fld id="{307118B5-B2B2-41D0-AD88-802466DC4C9C}" type="datetime1">
               <a:rPr lang="en-US" smtClean="0"/>
-              <a:t>11/28/2023</a:t>
+              <a:t>12/1/2023</a:t>
             </a:fld>
             <a:endParaRPr lang="en-US"/>
           </a:p>
@@ -1411,7 +1412,7 @@
           <a:p>
             <a:fld id="{A887045A-C55A-4595-956E-41A8106C81CE}" type="datetime1">
               <a:rPr lang="en-US" smtClean="0"/>
-              <a:t>11/28/2023</a:t>
+              <a:t>12/1/2023</a:t>
             </a:fld>
             <a:endParaRPr lang="en-US"/>
           </a:p>
@@ -1724,7 +1725,7 @@
           <a:p>
             <a:fld id="{A400E039-86BE-4471-913D-2AF0562605FA}" type="datetime1">
               <a:rPr lang="en-US" smtClean="0"/>
-              <a:t>11/28/2023</a:t>
+              <a:t>12/1/2023</a:t>
             </a:fld>
             <a:endParaRPr lang="en-US"/>
           </a:p>
@@ -2110,7 +2111,7 @@
           <a:p>
             <a:fld id="{671B40A3-B887-4003-956C-4DB05A6B7632}" type="datetime1">
               <a:rPr lang="en-US" smtClean="0"/>
-              <a:t>11/28/2023</a:t>
+              <a:t>12/1/2023</a:t>
             </a:fld>
             <a:endParaRPr lang="en-US"/>
           </a:p>
@@ -2544,7 +2545,7 @@
           <a:p>
             <a:fld id="{C45B75DD-E340-4AEF-A572-A5FC968EB017}" type="datetime1">
               <a:rPr lang="en-US" smtClean="0"/>
-              <a:t>11/28/2023</a:t>
+              <a:t>12/1/2023</a:t>
             </a:fld>
             <a:endParaRPr lang="en-US"/>
           </a:p>
@@ -2662,7 +2663,7 @@
           <a:p>
             <a:fld id="{D04475AF-77F7-4182-87A5-547CCD3810EB}" type="datetime1">
               <a:rPr lang="en-US" smtClean="0"/>
-              <a:t>11/28/2023</a:t>
+              <a:t>12/1/2023</a:t>
             </a:fld>
             <a:endParaRPr lang="en-US"/>
           </a:p>
@@ -2757,7 +2758,7 @@
           <a:p>
             <a:fld id="{A52CD5D1-9318-443C-99A2-D1A5B05249F2}" type="datetime1">
               <a:rPr lang="en-US" smtClean="0"/>
-              <a:t>11/28/2023</a:t>
+              <a:t>12/1/2023</a:t>
             </a:fld>
             <a:endParaRPr lang="en-US"/>
           </a:p>
@@ -3107,7 +3108,7 @@
           <a:p>
             <a:fld id="{1BF7661D-3A62-437B-A0DE-2D6D0381E868}" type="datetime1">
               <a:rPr lang="en-US" smtClean="0"/>
-              <a:t>11/28/2023</a:t>
+              <a:t>12/1/2023</a:t>
             </a:fld>
             <a:endParaRPr lang="en-US"/>
           </a:p>
@@ -3532,7 +3533,7 @@
           <a:p>
             <a:fld id="{8D5E6EBE-C33C-4CFB-9D8F-4A075187DDF0}" type="datetime1">
               <a:rPr lang="en-US" smtClean="0"/>
-              <a:t>11/28/2023</a:t>
+              <a:t>12/1/2023</a:t>
             </a:fld>
             <a:endParaRPr lang="en-US"/>
           </a:p>
@@ -3813,7 +3814,7 @@
           <a:p>
             <a:fld id="{00D52CC7-F745-4154-BA43-EB36BE615709}" type="datetime1">
               <a:rPr lang="en-US" smtClean="0"/>
-              <a:t>11/28/2023</a:t>
+              <a:t>12/1/2023</a:t>
             </a:fld>
             <a:endParaRPr lang="en-US"/>
           </a:p>
@@ -5458,6 +5459,1230 @@
 <file path=ppt/slides/slide12.xml><?xml version="1.0" encoding="utf-8"?>
 <p:sld xmlns:a="http://schemas.openxmlformats.org/drawingml/2006/main" xmlns:r="http://schemas.openxmlformats.org/officeDocument/2006/relationships" xmlns:p="http://schemas.openxmlformats.org/presentationml/2006/main">
   <p:cSld>
+    <p:spTree>
+      <p:nvGrpSpPr>
+        <p:cNvPr id="1" name=""/>
+        <p:cNvGrpSpPr/>
+        <p:nvPr/>
+      </p:nvGrpSpPr>
+      <p:grpSpPr>
+        <a:xfrm>
+          <a:off x="0" y="0"/>
+          <a:ext cx="0" cy="0"/>
+          <a:chOff x="0" y="0"/>
+          <a:chExt cx="0" cy="0"/>
+        </a:xfrm>
+      </p:grpSpPr>
+      <p:sp>
+        <p:nvSpPr>
+          <p:cNvPr id="2" name="Title 1">
+            <a:extLst>
+              <a:ext uri="{FF2B5EF4-FFF2-40B4-BE49-F238E27FC236}">
+                <a16:creationId xmlns:a16="http://schemas.microsoft.com/office/drawing/2014/main" id="{6E33F5B9-FB60-6AED-0EC9-282BD1344834}"/>
+              </a:ext>
+            </a:extLst>
+          </p:cNvPr>
+          <p:cNvSpPr>
+            <a:spLocks noGrp="1"/>
+          </p:cNvSpPr>
+          <p:nvPr>
+            <p:ph type="title"/>
+          </p:nvPr>
+        </p:nvSpPr>
+        <p:spPr/>
+        <p:txBody>
+          <a:bodyPr/>
+          <a:lstStyle/>
+          <a:p>
+            <a:r>
+              <a:rPr lang="en-US" dirty="0"/>
+              <a:t>RESULTS	</a:t>
+            </a:r>
+            <a:endParaRPr lang="en-IN" dirty="0"/>
+          </a:p>
+        </p:txBody>
+      </p:sp>
+      <p:graphicFrame>
+        <p:nvGraphicFramePr>
+          <p:cNvPr id="7" name="Content Placeholder 6">
+            <a:extLst>
+              <a:ext uri="{FF2B5EF4-FFF2-40B4-BE49-F238E27FC236}">
+                <a16:creationId xmlns:a16="http://schemas.microsoft.com/office/drawing/2014/main" id="{E387522C-0570-9C79-0AFE-AF8B261F59DC}"/>
+              </a:ext>
+            </a:extLst>
+          </p:cNvPr>
+          <p:cNvGraphicFramePr>
+            <a:graphicFrameLocks noGrp="1"/>
+          </p:cNvGraphicFramePr>
+          <p:nvPr>
+            <p:ph idx="1"/>
+            <p:extLst>
+              <p:ext uri="{D42A27DB-BD31-4B8C-83A1-F6EECF244321}">
+                <p14:modId xmlns:p14="http://schemas.microsoft.com/office/powerpoint/2010/main" val="171357599"/>
+              </p:ext>
+            </p:extLst>
+          </p:nvPr>
+        </p:nvGraphicFramePr>
+        <p:xfrm>
+          <a:off x="1063752" y="2093976"/>
+          <a:ext cx="9924037" cy="4178810"/>
+        </p:xfrm>
+        <a:graphic>
+          <a:graphicData uri="http://schemas.openxmlformats.org/drawingml/2006/table">
+            <a:tbl>
+              <a:tblPr firstRow="1" firstCol="1">
+                <a:tableStyleId>{5C22544A-7EE6-4342-B048-85BDC9FD1C3A}</a:tableStyleId>
+              </a:tblPr>
+              <a:tblGrid>
+                <a:gridCol w="2476730">
+                  <a:extLst>
+                    <a:ext uri="{9D8B030D-6E8A-4147-A177-3AD203B41FA5}">
+                      <a16:colId xmlns:a16="http://schemas.microsoft.com/office/drawing/2014/main" val="3252708738"/>
+                    </a:ext>
+                  </a:extLst>
+                </a:gridCol>
+                <a:gridCol w="1418534">
+                  <a:extLst>
+                    <a:ext uri="{9D8B030D-6E8A-4147-A177-3AD203B41FA5}">
+                      <a16:colId xmlns:a16="http://schemas.microsoft.com/office/drawing/2014/main" val="2955245957"/>
+                    </a:ext>
+                  </a:extLst>
+                </a:gridCol>
+                <a:gridCol w="1063901">
+                  <a:extLst>
+                    <a:ext uri="{9D8B030D-6E8A-4147-A177-3AD203B41FA5}">
+                      <a16:colId xmlns:a16="http://schemas.microsoft.com/office/drawing/2014/main" val="4231374189"/>
+                    </a:ext>
+                  </a:extLst>
+                </a:gridCol>
+                <a:gridCol w="1079320">
+                  <a:extLst>
+                    <a:ext uri="{9D8B030D-6E8A-4147-A177-3AD203B41FA5}">
+                      <a16:colId xmlns:a16="http://schemas.microsoft.com/office/drawing/2014/main" val="381280632"/>
+                    </a:ext>
+                  </a:extLst>
+                </a:gridCol>
+                <a:gridCol w="1350658">
+                  <a:extLst>
+                    <a:ext uri="{9D8B030D-6E8A-4147-A177-3AD203B41FA5}">
+                      <a16:colId xmlns:a16="http://schemas.microsoft.com/office/drawing/2014/main" val="2382105746"/>
+                    </a:ext>
+                  </a:extLst>
+                </a:gridCol>
+                <a:gridCol w="1232195">
+                  <a:extLst>
+                    <a:ext uri="{9D8B030D-6E8A-4147-A177-3AD203B41FA5}">
+                      <a16:colId xmlns:a16="http://schemas.microsoft.com/office/drawing/2014/main" val="2635911548"/>
+                    </a:ext>
+                  </a:extLst>
+                </a:gridCol>
+                <a:gridCol w="1302699">
+                  <a:extLst>
+                    <a:ext uri="{9D8B030D-6E8A-4147-A177-3AD203B41FA5}">
+                      <a16:colId xmlns:a16="http://schemas.microsoft.com/office/drawing/2014/main" val="2567761422"/>
+                    </a:ext>
+                  </a:extLst>
+                </a:gridCol>
+              </a:tblGrid>
+              <a:tr h="707225">
+                <a:tc>
+                  <a:txBody>
+                    <a:bodyPr/>
+                    <a:lstStyle/>
+                    <a:p>
+                      <a:pPr algn="ctr" fontAlgn="b"/>
+                      <a:r>
+                        <a:rPr lang="en-IN" sz="1600" u="none" strike="noStrike" dirty="0">
+                          <a:effectLst/>
+                        </a:rPr>
+                        <a:t>Regression Model</a:t>
+                      </a:r>
+                      <a:endParaRPr lang="en-IN" sz="1600" b="0" i="0" u="none" strike="noStrike" dirty="0">
+                        <a:solidFill>
+                          <a:srgbClr val="000000"/>
+                        </a:solidFill>
+                        <a:effectLst/>
+                        <a:latin typeface="Calibri" panose="020F0502020204030204" pitchFamily="34" charset="0"/>
+                        <a:cs typeface="Calibri" panose="020F0502020204030204" pitchFamily="34" charset="0"/>
+                      </a:endParaRPr>
+                    </a:p>
+                  </a:txBody>
+                  <a:tcPr marL="9525" marR="9525" marT="9525" marB="0" anchor="b"/>
+                </a:tc>
+                <a:tc>
+                  <a:txBody>
+                    <a:bodyPr/>
+                    <a:lstStyle/>
+                    <a:p>
+                      <a:pPr algn="ctr" fontAlgn="b"/>
+                      <a:r>
+                        <a:rPr lang="en-IN" sz="1600" u="none" strike="noStrike" dirty="0">
+                          <a:effectLst/>
+                        </a:rPr>
+                        <a:t>M.S.E</a:t>
+                      </a:r>
+                      <a:endParaRPr lang="en-IN" sz="1600" b="0" i="0" u="none" strike="noStrike" dirty="0">
+                        <a:solidFill>
+                          <a:srgbClr val="000000"/>
+                        </a:solidFill>
+                        <a:effectLst/>
+                        <a:latin typeface="Calibri" panose="020F0502020204030204" pitchFamily="34" charset="0"/>
+                        <a:cs typeface="Calibri" panose="020F0502020204030204" pitchFamily="34" charset="0"/>
+                      </a:endParaRPr>
+                    </a:p>
+                  </a:txBody>
+                  <a:tcPr marL="9525" marR="9525" marT="9525" marB="0" anchor="b"/>
+                </a:tc>
+                <a:tc>
+                  <a:txBody>
+                    <a:bodyPr/>
+                    <a:lstStyle/>
+                    <a:p>
+                      <a:pPr algn="ctr" fontAlgn="b"/>
+                      <a:r>
+                        <a:rPr lang="en-IN" sz="1600" u="none" strike="noStrike" dirty="0">
+                          <a:effectLst/>
+                        </a:rPr>
+                        <a:t>M.A.E</a:t>
+                      </a:r>
+                      <a:endParaRPr lang="en-IN" sz="1600" b="0" i="0" u="none" strike="noStrike" dirty="0">
+                        <a:solidFill>
+                          <a:srgbClr val="000000"/>
+                        </a:solidFill>
+                        <a:effectLst/>
+                        <a:latin typeface="Calibri" panose="020F0502020204030204" pitchFamily="34" charset="0"/>
+                        <a:cs typeface="Calibri" panose="020F0502020204030204" pitchFamily="34" charset="0"/>
+                      </a:endParaRPr>
+                    </a:p>
+                  </a:txBody>
+                  <a:tcPr marL="9525" marR="9525" marT="9525" marB="0" anchor="b"/>
+                </a:tc>
+                <a:tc>
+                  <a:txBody>
+                    <a:bodyPr/>
+                    <a:lstStyle/>
+                    <a:p>
+                      <a:pPr algn="ctr" fontAlgn="b"/>
+                      <a:r>
+                        <a:rPr lang="en-IN" sz="1600" u="none" strike="noStrike" dirty="0">
+                          <a:effectLst/>
+                        </a:rPr>
+                        <a:t>M.A.P.E</a:t>
+                      </a:r>
+                      <a:endParaRPr lang="en-IN" sz="1600" b="0" i="0" u="none" strike="noStrike" dirty="0">
+                        <a:solidFill>
+                          <a:srgbClr val="000000"/>
+                        </a:solidFill>
+                        <a:effectLst/>
+                        <a:latin typeface="Calibri" panose="020F0502020204030204" pitchFamily="34" charset="0"/>
+                        <a:cs typeface="Calibri" panose="020F0502020204030204" pitchFamily="34" charset="0"/>
+                      </a:endParaRPr>
+                    </a:p>
+                  </a:txBody>
+                  <a:tcPr marL="9525" marR="9525" marT="9525" marB="0" anchor="b"/>
+                </a:tc>
+                <a:tc>
+                  <a:txBody>
+                    <a:bodyPr/>
+                    <a:lstStyle/>
+                    <a:p>
+                      <a:pPr algn="ctr" fontAlgn="b"/>
+                      <a:r>
+                        <a:rPr lang="en-IN" sz="1600" u="none" strike="noStrike" dirty="0">
+                          <a:effectLst/>
+                        </a:rPr>
+                        <a:t>ACCURACY</a:t>
+                      </a:r>
+                      <a:endParaRPr lang="en-IN" sz="1600" b="0" i="0" u="none" strike="noStrike" dirty="0">
+                        <a:solidFill>
+                          <a:srgbClr val="000000"/>
+                        </a:solidFill>
+                        <a:effectLst/>
+                        <a:latin typeface="Calibri" panose="020F0502020204030204" pitchFamily="34" charset="0"/>
+                        <a:cs typeface="Calibri" panose="020F0502020204030204" pitchFamily="34" charset="0"/>
+                      </a:endParaRPr>
+                    </a:p>
+                  </a:txBody>
+                  <a:tcPr marL="9525" marR="9525" marT="9525" marB="0" anchor="b"/>
+                </a:tc>
+                <a:tc>
+                  <a:txBody>
+                    <a:bodyPr/>
+                    <a:lstStyle/>
+                    <a:p>
+                      <a:pPr algn="ctr" fontAlgn="b"/>
+                      <a:r>
+                        <a:rPr lang="en-IN" sz="1600" u="none" strike="noStrike" dirty="0">
+                          <a:effectLst/>
+                        </a:rPr>
+                        <a:t>Train_R2 Score</a:t>
+                      </a:r>
+                      <a:endParaRPr lang="en-IN" sz="1600" b="0" i="0" u="none" strike="noStrike" dirty="0">
+                        <a:solidFill>
+                          <a:srgbClr val="000000"/>
+                        </a:solidFill>
+                        <a:effectLst/>
+                        <a:latin typeface="Calibri" panose="020F0502020204030204" pitchFamily="34" charset="0"/>
+                        <a:cs typeface="Calibri" panose="020F0502020204030204" pitchFamily="34" charset="0"/>
+                      </a:endParaRPr>
+                    </a:p>
+                  </a:txBody>
+                  <a:tcPr marL="9525" marR="9525" marT="9525" marB="0" anchor="b"/>
+                </a:tc>
+                <a:tc>
+                  <a:txBody>
+                    <a:bodyPr/>
+                    <a:lstStyle/>
+                    <a:p>
+                      <a:pPr algn="ctr" fontAlgn="b"/>
+                      <a:r>
+                        <a:rPr lang="en-IN" sz="1600" u="none" strike="noStrike" dirty="0">
+                          <a:effectLst/>
+                        </a:rPr>
+                        <a:t>Test_R2 Score</a:t>
+                      </a:r>
+                      <a:endParaRPr lang="en-IN" sz="1600" b="0" i="0" u="none" strike="noStrike" dirty="0">
+                        <a:solidFill>
+                          <a:srgbClr val="000000"/>
+                        </a:solidFill>
+                        <a:effectLst/>
+                        <a:latin typeface="Calibri" panose="020F0502020204030204" pitchFamily="34" charset="0"/>
+                        <a:cs typeface="Calibri" panose="020F0502020204030204" pitchFamily="34" charset="0"/>
+                      </a:endParaRPr>
+                    </a:p>
+                  </a:txBody>
+                  <a:tcPr marL="9525" marR="9525" marT="9525" marB="0" anchor="b"/>
+                </a:tc>
+                <a:extLst>
+                  <a:ext uri="{0D108BD9-81ED-4DB2-BD59-A6C34878D82A}">
+                    <a16:rowId xmlns:a16="http://schemas.microsoft.com/office/drawing/2014/main" val="2571497553"/>
+                  </a:ext>
+                </a:extLst>
+              </a:tr>
+              <a:tr h="694317">
+                <a:tc>
+                  <a:txBody>
+                    <a:bodyPr/>
+                    <a:lstStyle/>
+                    <a:p>
+                      <a:pPr algn="l" fontAlgn="b"/>
+                      <a:r>
+                        <a:rPr lang="en-IN" sz="1600" u="none" strike="noStrike" dirty="0">
+                          <a:effectLst/>
+                        </a:rPr>
+                        <a:t>Linear </a:t>
+                      </a:r>
+                      <a:endParaRPr lang="en-IN" sz="1600" b="0" i="0" u="none" strike="noStrike" dirty="0">
+                        <a:solidFill>
+                          <a:srgbClr val="000000"/>
+                        </a:solidFill>
+                        <a:effectLst/>
+                        <a:latin typeface="Calibri" panose="020F0502020204030204" pitchFamily="34" charset="0"/>
+                        <a:cs typeface="Calibri" panose="020F0502020204030204" pitchFamily="34" charset="0"/>
+                      </a:endParaRPr>
+                    </a:p>
+                  </a:txBody>
+                  <a:tcPr marL="9525" marR="9525" marT="9525" marB="0" anchor="b"/>
+                </a:tc>
+                <a:tc>
+                  <a:txBody>
+                    <a:bodyPr/>
+                    <a:lstStyle/>
+                    <a:p>
+                      <a:pPr algn="r" fontAlgn="b"/>
+                      <a:r>
+                        <a:rPr lang="en-IN" sz="1600" u="none" strike="noStrike">
+                          <a:effectLst/>
+                        </a:rPr>
+                        <a:t>839240.2362</a:t>
+                      </a:r>
+                      <a:endParaRPr lang="en-IN" sz="1600" b="0" i="0" u="none" strike="noStrike">
+                        <a:solidFill>
+                          <a:srgbClr val="000000"/>
+                        </a:solidFill>
+                        <a:effectLst/>
+                        <a:latin typeface="Calibri" panose="020F0502020204030204" pitchFamily="34" charset="0"/>
+                        <a:cs typeface="Calibri" panose="020F0502020204030204" pitchFamily="34" charset="0"/>
+                      </a:endParaRPr>
+                    </a:p>
+                  </a:txBody>
+                  <a:tcPr marL="9525" marR="9525" marT="9525" marB="0" anchor="b"/>
+                </a:tc>
+                <a:tc>
+                  <a:txBody>
+                    <a:bodyPr/>
+                    <a:lstStyle/>
+                    <a:p>
+                      <a:pPr algn="r" fontAlgn="b"/>
+                      <a:r>
+                        <a:rPr lang="en-IN" sz="1600" u="none" strike="noStrike">
+                          <a:effectLst/>
+                        </a:rPr>
+                        <a:t>753.39</a:t>
+                      </a:r>
+                      <a:endParaRPr lang="en-IN" sz="1600" b="0" i="0" u="none" strike="noStrike">
+                        <a:solidFill>
+                          <a:srgbClr val="000000"/>
+                        </a:solidFill>
+                        <a:effectLst/>
+                        <a:latin typeface="Calibri" panose="020F0502020204030204" pitchFamily="34" charset="0"/>
+                        <a:cs typeface="Calibri" panose="020F0502020204030204" pitchFamily="34" charset="0"/>
+                      </a:endParaRPr>
+                    </a:p>
+                  </a:txBody>
+                  <a:tcPr marL="9525" marR="9525" marT="9525" marB="0" anchor="b"/>
+                </a:tc>
+                <a:tc>
+                  <a:txBody>
+                    <a:bodyPr/>
+                    <a:lstStyle/>
+                    <a:p>
+                      <a:pPr algn="r" fontAlgn="b"/>
+                      <a:r>
+                        <a:rPr lang="en-IN" sz="1600" u="none" strike="noStrike">
+                          <a:effectLst/>
+                        </a:rPr>
+                        <a:t>4.853283</a:t>
+                      </a:r>
+                      <a:endParaRPr lang="en-IN" sz="1600" b="0" i="0" u="none" strike="noStrike">
+                        <a:solidFill>
+                          <a:srgbClr val="000000"/>
+                        </a:solidFill>
+                        <a:effectLst/>
+                        <a:latin typeface="Calibri" panose="020F0502020204030204" pitchFamily="34" charset="0"/>
+                        <a:cs typeface="Calibri" panose="020F0502020204030204" pitchFamily="34" charset="0"/>
+                      </a:endParaRPr>
+                    </a:p>
+                  </a:txBody>
+                  <a:tcPr marL="9525" marR="9525" marT="9525" marB="0" anchor="b"/>
+                </a:tc>
+                <a:tc>
+                  <a:txBody>
+                    <a:bodyPr/>
+                    <a:lstStyle/>
+                    <a:p>
+                      <a:pPr algn="r" fontAlgn="b"/>
+                      <a:r>
+                        <a:rPr lang="en-IN" sz="1600" u="none" strike="noStrike">
+                          <a:effectLst/>
+                        </a:rPr>
+                        <a:t>95.15%</a:t>
+                      </a:r>
+                      <a:endParaRPr lang="en-IN" sz="1600" b="0" i="0" u="none" strike="noStrike">
+                        <a:solidFill>
+                          <a:srgbClr val="000000"/>
+                        </a:solidFill>
+                        <a:effectLst/>
+                        <a:latin typeface="Calibri" panose="020F0502020204030204" pitchFamily="34" charset="0"/>
+                        <a:cs typeface="Calibri" panose="020F0502020204030204" pitchFamily="34" charset="0"/>
+                      </a:endParaRPr>
+                    </a:p>
+                  </a:txBody>
+                  <a:tcPr marL="9525" marR="9525" marT="9525" marB="0" anchor="b"/>
+                </a:tc>
+                <a:tc>
+                  <a:txBody>
+                    <a:bodyPr/>
+                    <a:lstStyle/>
+                    <a:p>
+                      <a:pPr algn="r" fontAlgn="b"/>
+                      <a:r>
+                        <a:rPr lang="en-IN" sz="1600" u="none" strike="noStrike">
+                          <a:effectLst/>
+                        </a:rPr>
+                        <a:t>0.9568</a:t>
+                      </a:r>
+                      <a:endParaRPr lang="en-IN" sz="1600" b="0" i="0" u="none" strike="noStrike">
+                        <a:solidFill>
+                          <a:srgbClr val="000000"/>
+                        </a:solidFill>
+                        <a:effectLst/>
+                        <a:latin typeface="Calibri" panose="020F0502020204030204" pitchFamily="34" charset="0"/>
+                        <a:cs typeface="Calibri" panose="020F0502020204030204" pitchFamily="34" charset="0"/>
+                      </a:endParaRPr>
+                    </a:p>
+                  </a:txBody>
+                  <a:tcPr marL="9525" marR="9525" marT="9525" marB="0" anchor="b"/>
+                </a:tc>
+                <a:tc>
+                  <a:txBody>
+                    <a:bodyPr/>
+                    <a:lstStyle/>
+                    <a:p>
+                      <a:pPr algn="r" fontAlgn="b"/>
+                      <a:r>
+                        <a:rPr lang="en-IN" sz="1600" u="none" strike="noStrike">
+                          <a:effectLst/>
+                        </a:rPr>
+                        <a:t>0.9568</a:t>
+                      </a:r>
+                      <a:endParaRPr lang="en-IN" sz="1600" b="0" i="0" u="none" strike="noStrike">
+                        <a:solidFill>
+                          <a:srgbClr val="000000"/>
+                        </a:solidFill>
+                        <a:effectLst/>
+                        <a:latin typeface="Calibri" panose="020F0502020204030204" pitchFamily="34" charset="0"/>
+                        <a:cs typeface="Calibri" panose="020F0502020204030204" pitchFamily="34" charset="0"/>
+                      </a:endParaRPr>
+                    </a:p>
+                  </a:txBody>
+                  <a:tcPr marL="9525" marR="9525" marT="9525" marB="0" anchor="b"/>
+                </a:tc>
+                <a:extLst>
+                  <a:ext uri="{0D108BD9-81ED-4DB2-BD59-A6C34878D82A}">
+                    <a16:rowId xmlns:a16="http://schemas.microsoft.com/office/drawing/2014/main" val="2394032540"/>
+                  </a:ext>
+                </a:extLst>
+              </a:tr>
+              <a:tr h="694317">
+                <a:tc>
+                  <a:txBody>
+                    <a:bodyPr/>
+                    <a:lstStyle/>
+                    <a:p>
+                      <a:pPr algn="l" fontAlgn="b"/>
+                      <a:r>
+                        <a:rPr lang="en-IN" sz="1600" u="none" strike="noStrike">
+                          <a:effectLst/>
+                        </a:rPr>
+                        <a:t>Random Forest</a:t>
+                      </a:r>
+                      <a:endParaRPr lang="en-IN" sz="1600" b="0" i="0" u="none" strike="noStrike">
+                        <a:solidFill>
+                          <a:srgbClr val="000000"/>
+                        </a:solidFill>
+                        <a:effectLst/>
+                        <a:latin typeface="Calibri" panose="020F0502020204030204" pitchFamily="34" charset="0"/>
+                        <a:cs typeface="Calibri" panose="020F0502020204030204" pitchFamily="34" charset="0"/>
+                      </a:endParaRPr>
+                    </a:p>
+                  </a:txBody>
+                  <a:tcPr marL="9525" marR="9525" marT="9525" marB="0" anchor="b"/>
+                </a:tc>
+                <a:tc>
+                  <a:txBody>
+                    <a:bodyPr/>
+                    <a:lstStyle/>
+                    <a:p>
+                      <a:pPr algn="r" fontAlgn="b"/>
+                      <a:r>
+                        <a:rPr lang="en-IN" sz="1600" u="none" strike="noStrike">
+                          <a:effectLst/>
+                        </a:rPr>
+                        <a:t>139478.7883</a:t>
+                      </a:r>
+                      <a:endParaRPr lang="en-IN" sz="1600" b="0" i="0" u="none" strike="noStrike">
+                        <a:solidFill>
+                          <a:srgbClr val="000000"/>
+                        </a:solidFill>
+                        <a:effectLst/>
+                        <a:latin typeface="Calibri" panose="020F0502020204030204" pitchFamily="34" charset="0"/>
+                        <a:cs typeface="Calibri" panose="020F0502020204030204" pitchFamily="34" charset="0"/>
+                      </a:endParaRPr>
+                    </a:p>
+                  </a:txBody>
+                  <a:tcPr marL="9525" marR="9525" marT="9525" marB="0" anchor="b"/>
+                </a:tc>
+                <a:tc>
+                  <a:txBody>
+                    <a:bodyPr/>
+                    <a:lstStyle/>
+                    <a:p>
+                      <a:pPr algn="r" fontAlgn="b"/>
+                      <a:r>
+                        <a:rPr lang="en-IN" sz="1600" u="none" strike="noStrike">
+                          <a:effectLst/>
+                        </a:rPr>
+                        <a:t>305.8503</a:t>
+                      </a:r>
+                      <a:endParaRPr lang="en-IN" sz="1600" b="0" i="0" u="none" strike="noStrike">
+                        <a:solidFill>
+                          <a:srgbClr val="000000"/>
+                        </a:solidFill>
+                        <a:effectLst/>
+                        <a:latin typeface="Calibri" panose="020F0502020204030204" pitchFamily="34" charset="0"/>
+                        <a:cs typeface="Calibri" panose="020F0502020204030204" pitchFamily="34" charset="0"/>
+                      </a:endParaRPr>
+                    </a:p>
+                  </a:txBody>
+                  <a:tcPr marL="9525" marR="9525" marT="9525" marB="0" anchor="b"/>
+                </a:tc>
+                <a:tc>
+                  <a:txBody>
+                    <a:bodyPr/>
+                    <a:lstStyle/>
+                    <a:p>
+                      <a:pPr algn="l" fontAlgn="b"/>
+                      <a:r>
+                        <a:rPr lang="en-IN" sz="1600" u="none" strike="noStrike">
+                          <a:effectLst/>
+                        </a:rPr>
+                        <a:t> </a:t>
+                      </a:r>
+                      <a:endParaRPr lang="en-IN" sz="1600" b="0" i="0" u="none" strike="noStrike">
+                        <a:solidFill>
+                          <a:srgbClr val="000000"/>
+                        </a:solidFill>
+                        <a:effectLst/>
+                        <a:latin typeface="Calibri" panose="020F0502020204030204" pitchFamily="34" charset="0"/>
+                        <a:cs typeface="Calibri" panose="020F0502020204030204" pitchFamily="34" charset="0"/>
+                      </a:endParaRPr>
+                    </a:p>
+                  </a:txBody>
+                  <a:tcPr marL="9525" marR="9525" marT="9525" marB="0" anchor="b"/>
+                </a:tc>
+                <a:tc>
+                  <a:txBody>
+                    <a:bodyPr/>
+                    <a:lstStyle/>
+                    <a:p>
+                      <a:pPr algn="l" fontAlgn="b"/>
+                      <a:r>
+                        <a:rPr lang="en-IN" sz="1600" u="none" strike="noStrike">
+                          <a:effectLst/>
+                        </a:rPr>
+                        <a:t> </a:t>
+                      </a:r>
+                      <a:endParaRPr lang="en-IN" sz="1600" b="0" i="0" u="none" strike="noStrike">
+                        <a:solidFill>
+                          <a:srgbClr val="000000"/>
+                        </a:solidFill>
+                        <a:effectLst/>
+                        <a:latin typeface="Calibri" panose="020F0502020204030204" pitchFamily="34" charset="0"/>
+                        <a:cs typeface="Calibri" panose="020F0502020204030204" pitchFamily="34" charset="0"/>
+                      </a:endParaRPr>
+                    </a:p>
+                  </a:txBody>
+                  <a:tcPr marL="9525" marR="9525" marT="9525" marB="0" anchor="b"/>
+                </a:tc>
+                <a:tc>
+                  <a:txBody>
+                    <a:bodyPr/>
+                    <a:lstStyle/>
+                    <a:p>
+                      <a:pPr algn="l" fontAlgn="b"/>
+                      <a:r>
+                        <a:rPr lang="en-IN" sz="1600" u="none" strike="noStrike" dirty="0">
+                          <a:effectLst/>
+                        </a:rPr>
+                        <a:t> </a:t>
+                      </a:r>
+                      <a:endParaRPr lang="en-IN" sz="1600" b="0" i="0" u="none" strike="noStrike" dirty="0">
+                        <a:solidFill>
+                          <a:srgbClr val="000000"/>
+                        </a:solidFill>
+                        <a:effectLst/>
+                        <a:latin typeface="Calibri" panose="020F0502020204030204" pitchFamily="34" charset="0"/>
+                        <a:cs typeface="Calibri" panose="020F0502020204030204" pitchFamily="34" charset="0"/>
+                      </a:endParaRPr>
+                    </a:p>
+                  </a:txBody>
+                  <a:tcPr marL="9525" marR="9525" marT="9525" marB="0" anchor="b"/>
+                </a:tc>
+                <a:tc>
+                  <a:txBody>
+                    <a:bodyPr/>
+                    <a:lstStyle/>
+                    <a:p>
+                      <a:pPr algn="l" fontAlgn="b"/>
+                      <a:r>
+                        <a:rPr lang="en-IN" sz="1600" u="none" strike="noStrike">
+                          <a:effectLst/>
+                        </a:rPr>
+                        <a:t> </a:t>
+                      </a:r>
+                      <a:endParaRPr lang="en-IN" sz="1600" b="0" i="0" u="none" strike="noStrike">
+                        <a:solidFill>
+                          <a:srgbClr val="000000"/>
+                        </a:solidFill>
+                        <a:effectLst/>
+                        <a:latin typeface="Calibri" panose="020F0502020204030204" pitchFamily="34" charset="0"/>
+                        <a:cs typeface="Calibri" panose="020F0502020204030204" pitchFamily="34" charset="0"/>
+                      </a:endParaRPr>
+                    </a:p>
+                  </a:txBody>
+                  <a:tcPr marL="9525" marR="9525" marT="9525" marB="0" anchor="b"/>
+                </a:tc>
+                <a:extLst>
+                  <a:ext uri="{0D108BD9-81ED-4DB2-BD59-A6C34878D82A}">
+                    <a16:rowId xmlns:a16="http://schemas.microsoft.com/office/drawing/2014/main" val="721918194"/>
+                  </a:ext>
+                </a:extLst>
+              </a:tr>
+              <a:tr h="694317">
+                <a:tc>
+                  <a:txBody>
+                    <a:bodyPr/>
+                    <a:lstStyle/>
+                    <a:p>
+                      <a:pPr algn="l" fontAlgn="b"/>
+                      <a:r>
+                        <a:rPr lang="en-IN" sz="1600" u="none" strike="noStrike">
+                          <a:effectLst/>
+                        </a:rPr>
+                        <a:t>SVM</a:t>
+                      </a:r>
+                      <a:endParaRPr lang="en-IN" sz="1600" b="0" i="0" u="none" strike="noStrike">
+                        <a:solidFill>
+                          <a:srgbClr val="000000"/>
+                        </a:solidFill>
+                        <a:effectLst/>
+                        <a:latin typeface="Calibri" panose="020F0502020204030204" pitchFamily="34" charset="0"/>
+                        <a:cs typeface="Calibri" panose="020F0502020204030204" pitchFamily="34" charset="0"/>
+                      </a:endParaRPr>
+                    </a:p>
+                  </a:txBody>
+                  <a:tcPr marL="9525" marR="9525" marT="9525" marB="0" anchor="b"/>
+                </a:tc>
+                <a:tc>
+                  <a:txBody>
+                    <a:bodyPr/>
+                    <a:lstStyle/>
+                    <a:p>
+                      <a:pPr algn="r" fontAlgn="b"/>
+                      <a:r>
+                        <a:rPr lang="en-IN" sz="1600" u="none" strike="noStrike">
+                          <a:effectLst/>
+                        </a:rPr>
+                        <a:t>84801.66551</a:t>
+                      </a:r>
+                      <a:endParaRPr lang="en-IN" sz="1600" b="0" i="0" u="none" strike="noStrike">
+                        <a:solidFill>
+                          <a:srgbClr val="000000"/>
+                        </a:solidFill>
+                        <a:effectLst/>
+                        <a:latin typeface="Calibri" panose="020F0502020204030204" pitchFamily="34" charset="0"/>
+                        <a:cs typeface="Calibri" panose="020F0502020204030204" pitchFamily="34" charset="0"/>
+                      </a:endParaRPr>
+                    </a:p>
+                  </a:txBody>
+                  <a:tcPr marL="9525" marR="9525" marT="9525" marB="0" anchor="b"/>
+                </a:tc>
+                <a:tc>
+                  <a:txBody>
+                    <a:bodyPr/>
+                    <a:lstStyle/>
+                    <a:p>
+                      <a:pPr algn="r" fontAlgn="b"/>
+                      <a:r>
+                        <a:rPr lang="en-IN" sz="1600" u="none" strike="noStrike">
+                          <a:effectLst/>
+                        </a:rPr>
+                        <a:t>251.9165</a:t>
+                      </a:r>
+                      <a:endParaRPr lang="en-IN" sz="1600" b="0" i="0" u="none" strike="noStrike">
+                        <a:solidFill>
+                          <a:srgbClr val="000000"/>
+                        </a:solidFill>
+                        <a:effectLst/>
+                        <a:latin typeface="Calibri" panose="020F0502020204030204" pitchFamily="34" charset="0"/>
+                        <a:cs typeface="Calibri" panose="020F0502020204030204" pitchFamily="34" charset="0"/>
+                      </a:endParaRPr>
+                    </a:p>
+                  </a:txBody>
+                  <a:tcPr marL="9525" marR="9525" marT="9525" marB="0" anchor="b"/>
+                </a:tc>
+                <a:tc>
+                  <a:txBody>
+                    <a:bodyPr/>
+                    <a:lstStyle/>
+                    <a:p>
+                      <a:pPr algn="l" fontAlgn="b"/>
+                      <a:r>
+                        <a:rPr lang="en-IN" sz="1600" u="none" strike="noStrike">
+                          <a:effectLst/>
+                        </a:rPr>
+                        <a:t> </a:t>
+                      </a:r>
+                      <a:endParaRPr lang="en-IN" sz="1600" b="0" i="0" u="none" strike="noStrike">
+                        <a:solidFill>
+                          <a:srgbClr val="000000"/>
+                        </a:solidFill>
+                        <a:effectLst/>
+                        <a:latin typeface="Calibri" panose="020F0502020204030204" pitchFamily="34" charset="0"/>
+                        <a:cs typeface="Calibri" panose="020F0502020204030204" pitchFamily="34" charset="0"/>
+                      </a:endParaRPr>
+                    </a:p>
+                  </a:txBody>
+                  <a:tcPr marL="9525" marR="9525" marT="9525" marB="0" anchor="b"/>
+                </a:tc>
+                <a:tc>
+                  <a:txBody>
+                    <a:bodyPr/>
+                    <a:lstStyle/>
+                    <a:p>
+                      <a:pPr algn="l" fontAlgn="b"/>
+                      <a:r>
+                        <a:rPr lang="en-IN" sz="1600" u="none" strike="noStrike">
+                          <a:effectLst/>
+                        </a:rPr>
+                        <a:t> </a:t>
+                      </a:r>
+                      <a:endParaRPr lang="en-IN" sz="1600" b="0" i="0" u="none" strike="noStrike">
+                        <a:solidFill>
+                          <a:srgbClr val="000000"/>
+                        </a:solidFill>
+                        <a:effectLst/>
+                        <a:latin typeface="Calibri" panose="020F0502020204030204" pitchFamily="34" charset="0"/>
+                        <a:cs typeface="Calibri" panose="020F0502020204030204" pitchFamily="34" charset="0"/>
+                      </a:endParaRPr>
+                    </a:p>
+                  </a:txBody>
+                  <a:tcPr marL="9525" marR="9525" marT="9525" marB="0" anchor="b"/>
+                </a:tc>
+                <a:tc>
+                  <a:txBody>
+                    <a:bodyPr/>
+                    <a:lstStyle/>
+                    <a:p>
+                      <a:pPr algn="l" fontAlgn="b"/>
+                      <a:r>
+                        <a:rPr lang="en-IN" sz="1600" u="none" strike="noStrike">
+                          <a:effectLst/>
+                        </a:rPr>
+                        <a:t> </a:t>
+                      </a:r>
+                      <a:endParaRPr lang="en-IN" sz="1600" b="0" i="0" u="none" strike="noStrike">
+                        <a:solidFill>
+                          <a:srgbClr val="000000"/>
+                        </a:solidFill>
+                        <a:effectLst/>
+                        <a:latin typeface="Calibri" panose="020F0502020204030204" pitchFamily="34" charset="0"/>
+                        <a:cs typeface="Calibri" panose="020F0502020204030204" pitchFamily="34" charset="0"/>
+                      </a:endParaRPr>
+                    </a:p>
+                  </a:txBody>
+                  <a:tcPr marL="9525" marR="9525" marT="9525" marB="0" anchor="b"/>
+                </a:tc>
+                <a:tc>
+                  <a:txBody>
+                    <a:bodyPr/>
+                    <a:lstStyle/>
+                    <a:p>
+                      <a:pPr algn="l" fontAlgn="b"/>
+                      <a:r>
+                        <a:rPr lang="en-IN" sz="1600" u="none" strike="noStrike">
+                          <a:effectLst/>
+                        </a:rPr>
+                        <a:t> </a:t>
+                      </a:r>
+                      <a:endParaRPr lang="en-IN" sz="1600" b="0" i="0" u="none" strike="noStrike">
+                        <a:solidFill>
+                          <a:srgbClr val="000000"/>
+                        </a:solidFill>
+                        <a:effectLst/>
+                        <a:latin typeface="Calibri" panose="020F0502020204030204" pitchFamily="34" charset="0"/>
+                        <a:cs typeface="Calibri" panose="020F0502020204030204" pitchFamily="34" charset="0"/>
+                      </a:endParaRPr>
+                    </a:p>
+                  </a:txBody>
+                  <a:tcPr marL="9525" marR="9525" marT="9525" marB="0" anchor="b"/>
+                </a:tc>
+                <a:extLst>
+                  <a:ext uri="{0D108BD9-81ED-4DB2-BD59-A6C34878D82A}">
+                    <a16:rowId xmlns:a16="http://schemas.microsoft.com/office/drawing/2014/main" val="3158295975"/>
+                  </a:ext>
+                </a:extLst>
+              </a:tr>
+              <a:tr h="694317">
+                <a:tc>
+                  <a:txBody>
+                    <a:bodyPr/>
+                    <a:lstStyle/>
+                    <a:p>
+                      <a:pPr algn="l" fontAlgn="b"/>
+                      <a:r>
+                        <a:rPr lang="en-IN" sz="1600" u="none" strike="noStrike">
+                          <a:effectLst/>
+                        </a:rPr>
+                        <a:t>Gradient Boosting </a:t>
+                      </a:r>
+                      <a:endParaRPr lang="en-IN" sz="1600" b="0" i="0" u="none" strike="noStrike">
+                        <a:solidFill>
+                          <a:srgbClr val="000000"/>
+                        </a:solidFill>
+                        <a:effectLst/>
+                        <a:latin typeface="Calibri" panose="020F0502020204030204" pitchFamily="34" charset="0"/>
+                        <a:cs typeface="Calibri" panose="020F0502020204030204" pitchFamily="34" charset="0"/>
+                      </a:endParaRPr>
+                    </a:p>
+                  </a:txBody>
+                  <a:tcPr marL="9525" marR="9525" marT="9525" marB="0" anchor="b"/>
+                </a:tc>
+                <a:tc>
+                  <a:txBody>
+                    <a:bodyPr/>
+                    <a:lstStyle/>
+                    <a:p>
+                      <a:pPr algn="r" fontAlgn="b"/>
+                      <a:r>
+                        <a:rPr lang="en-IN" sz="1600" u="none" strike="noStrike">
+                          <a:effectLst/>
+                        </a:rPr>
+                        <a:t>126511.283</a:t>
+                      </a:r>
+                      <a:endParaRPr lang="en-IN" sz="1600" b="0" i="0" u="none" strike="noStrike">
+                        <a:solidFill>
+                          <a:srgbClr val="000000"/>
+                        </a:solidFill>
+                        <a:effectLst/>
+                        <a:latin typeface="Calibri" panose="020F0502020204030204" pitchFamily="34" charset="0"/>
+                        <a:cs typeface="Calibri" panose="020F0502020204030204" pitchFamily="34" charset="0"/>
+                      </a:endParaRPr>
+                    </a:p>
+                  </a:txBody>
+                  <a:tcPr marL="9525" marR="9525" marT="9525" marB="0" anchor="b"/>
+                </a:tc>
+                <a:tc>
+                  <a:txBody>
+                    <a:bodyPr/>
+                    <a:lstStyle/>
+                    <a:p>
+                      <a:pPr algn="r" fontAlgn="b"/>
+                      <a:r>
+                        <a:rPr lang="en-IN" sz="1600" u="none" strike="noStrike">
+                          <a:effectLst/>
+                        </a:rPr>
+                        <a:t>292.57</a:t>
+                      </a:r>
+                      <a:endParaRPr lang="en-IN" sz="1600" b="0" i="0" u="none" strike="noStrike">
+                        <a:solidFill>
+                          <a:srgbClr val="000000"/>
+                        </a:solidFill>
+                        <a:effectLst/>
+                        <a:latin typeface="Calibri" panose="020F0502020204030204" pitchFamily="34" charset="0"/>
+                        <a:cs typeface="Calibri" panose="020F0502020204030204" pitchFamily="34" charset="0"/>
+                      </a:endParaRPr>
+                    </a:p>
+                  </a:txBody>
+                  <a:tcPr marL="9525" marR="9525" marT="9525" marB="0" anchor="b"/>
+                </a:tc>
+                <a:tc>
+                  <a:txBody>
+                    <a:bodyPr/>
+                    <a:lstStyle/>
+                    <a:p>
+                      <a:pPr algn="r" fontAlgn="b"/>
+                      <a:r>
+                        <a:rPr lang="en-IN" sz="1600" u="none" strike="noStrike">
+                          <a:effectLst/>
+                        </a:rPr>
+                        <a:t>1.899895</a:t>
+                      </a:r>
+                      <a:endParaRPr lang="en-IN" sz="1600" b="0" i="0" u="none" strike="noStrike">
+                        <a:solidFill>
+                          <a:srgbClr val="000000"/>
+                        </a:solidFill>
+                        <a:effectLst/>
+                        <a:latin typeface="Calibri" panose="020F0502020204030204" pitchFamily="34" charset="0"/>
+                        <a:cs typeface="Calibri" panose="020F0502020204030204" pitchFamily="34" charset="0"/>
+                      </a:endParaRPr>
+                    </a:p>
+                  </a:txBody>
+                  <a:tcPr marL="9525" marR="9525" marT="9525" marB="0" anchor="b"/>
+                </a:tc>
+                <a:tc>
+                  <a:txBody>
+                    <a:bodyPr/>
+                    <a:lstStyle/>
+                    <a:p>
+                      <a:pPr algn="r" fontAlgn="b"/>
+                      <a:r>
+                        <a:rPr lang="en-IN" sz="1600" u="none" strike="noStrike">
+                          <a:effectLst/>
+                        </a:rPr>
+                        <a:t>98.10%</a:t>
+                      </a:r>
+                      <a:endParaRPr lang="en-IN" sz="1600" b="0" i="0" u="none" strike="noStrike">
+                        <a:solidFill>
+                          <a:srgbClr val="000000"/>
+                        </a:solidFill>
+                        <a:effectLst/>
+                        <a:latin typeface="Calibri" panose="020F0502020204030204" pitchFamily="34" charset="0"/>
+                        <a:cs typeface="Calibri" panose="020F0502020204030204" pitchFamily="34" charset="0"/>
+                      </a:endParaRPr>
+                    </a:p>
+                  </a:txBody>
+                  <a:tcPr marL="9525" marR="9525" marT="9525" marB="0" anchor="b"/>
+                </a:tc>
+                <a:tc>
+                  <a:txBody>
+                    <a:bodyPr/>
+                    <a:lstStyle/>
+                    <a:p>
+                      <a:pPr algn="r" fontAlgn="b"/>
+                      <a:r>
+                        <a:rPr lang="en-IN" sz="1600" u="none" strike="noStrike">
+                          <a:effectLst/>
+                        </a:rPr>
+                        <a:t>0.9941</a:t>
+                      </a:r>
+                      <a:endParaRPr lang="en-IN" sz="1600" b="0" i="0" u="none" strike="noStrike">
+                        <a:solidFill>
+                          <a:srgbClr val="000000"/>
+                        </a:solidFill>
+                        <a:effectLst/>
+                        <a:latin typeface="Calibri" panose="020F0502020204030204" pitchFamily="34" charset="0"/>
+                        <a:cs typeface="Calibri" panose="020F0502020204030204" pitchFamily="34" charset="0"/>
+                      </a:endParaRPr>
+                    </a:p>
+                  </a:txBody>
+                  <a:tcPr marL="9525" marR="9525" marT="9525" marB="0" anchor="b"/>
+                </a:tc>
+                <a:tc>
+                  <a:txBody>
+                    <a:bodyPr/>
+                    <a:lstStyle/>
+                    <a:p>
+                      <a:pPr algn="r" fontAlgn="b"/>
+                      <a:r>
+                        <a:rPr lang="en-IN" sz="1600" u="none" strike="noStrike">
+                          <a:effectLst/>
+                        </a:rPr>
+                        <a:t>0.9935</a:t>
+                      </a:r>
+                      <a:endParaRPr lang="en-IN" sz="1600" b="0" i="0" u="none" strike="noStrike">
+                        <a:solidFill>
+                          <a:srgbClr val="000000"/>
+                        </a:solidFill>
+                        <a:effectLst/>
+                        <a:latin typeface="Calibri" panose="020F0502020204030204" pitchFamily="34" charset="0"/>
+                        <a:cs typeface="Calibri" panose="020F0502020204030204" pitchFamily="34" charset="0"/>
+                      </a:endParaRPr>
+                    </a:p>
+                  </a:txBody>
+                  <a:tcPr marL="9525" marR="9525" marT="9525" marB="0" anchor="b"/>
+                </a:tc>
+                <a:extLst>
+                  <a:ext uri="{0D108BD9-81ED-4DB2-BD59-A6C34878D82A}">
+                    <a16:rowId xmlns:a16="http://schemas.microsoft.com/office/drawing/2014/main" val="4029120021"/>
+                  </a:ext>
+                </a:extLst>
+              </a:tr>
+              <a:tr h="694317">
+                <a:tc>
+                  <a:txBody>
+                    <a:bodyPr/>
+                    <a:lstStyle/>
+                    <a:p>
+                      <a:pPr algn="l" fontAlgn="b"/>
+                      <a:r>
+                        <a:rPr lang="en-IN" sz="1600" u="none" strike="noStrike">
+                          <a:effectLst/>
+                        </a:rPr>
+                        <a:t>XG Boost </a:t>
+                      </a:r>
+                      <a:endParaRPr lang="en-IN" sz="1600" b="0" i="0" u="none" strike="noStrike">
+                        <a:solidFill>
+                          <a:srgbClr val="000000"/>
+                        </a:solidFill>
+                        <a:effectLst/>
+                        <a:latin typeface="Calibri" panose="020F0502020204030204" pitchFamily="34" charset="0"/>
+                        <a:cs typeface="Calibri" panose="020F0502020204030204" pitchFamily="34" charset="0"/>
+                      </a:endParaRPr>
+                    </a:p>
+                  </a:txBody>
+                  <a:tcPr marL="9525" marR="9525" marT="9525" marB="0" anchor="b"/>
+                </a:tc>
+                <a:tc>
+                  <a:txBody>
+                    <a:bodyPr/>
+                    <a:lstStyle/>
+                    <a:p>
+                      <a:pPr algn="r" fontAlgn="b"/>
+                      <a:r>
+                        <a:rPr lang="en-IN" sz="1600" u="none" strike="noStrike">
+                          <a:effectLst/>
+                        </a:rPr>
+                        <a:t>103509.9365</a:t>
+                      </a:r>
+                      <a:endParaRPr lang="en-IN" sz="1600" b="0" i="0" u="none" strike="noStrike">
+                        <a:solidFill>
+                          <a:srgbClr val="000000"/>
+                        </a:solidFill>
+                        <a:effectLst/>
+                        <a:latin typeface="Calibri" panose="020F0502020204030204" pitchFamily="34" charset="0"/>
+                        <a:cs typeface="Calibri" panose="020F0502020204030204" pitchFamily="34" charset="0"/>
+                      </a:endParaRPr>
+                    </a:p>
+                  </a:txBody>
+                  <a:tcPr marL="9525" marR="9525" marT="9525" marB="0" anchor="b"/>
+                </a:tc>
+                <a:tc>
+                  <a:txBody>
+                    <a:bodyPr/>
+                    <a:lstStyle/>
+                    <a:p>
+                      <a:pPr algn="r" fontAlgn="b"/>
+                      <a:r>
+                        <a:rPr lang="en-IN" sz="1600" u="none" strike="noStrike">
+                          <a:effectLst/>
+                        </a:rPr>
+                        <a:t>270.27</a:t>
+                      </a:r>
+                      <a:endParaRPr lang="en-IN" sz="1600" b="0" i="0" u="none" strike="noStrike">
+                        <a:solidFill>
+                          <a:srgbClr val="000000"/>
+                        </a:solidFill>
+                        <a:effectLst/>
+                        <a:latin typeface="Calibri" panose="020F0502020204030204" pitchFamily="34" charset="0"/>
+                        <a:cs typeface="Calibri" panose="020F0502020204030204" pitchFamily="34" charset="0"/>
+                      </a:endParaRPr>
+                    </a:p>
+                  </a:txBody>
+                  <a:tcPr marL="9525" marR="9525" marT="9525" marB="0" anchor="b"/>
+                </a:tc>
+                <a:tc>
+                  <a:txBody>
+                    <a:bodyPr/>
+                    <a:lstStyle/>
+                    <a:p>
+                      <a:pPr algn="r" fontAlgn="b"/>
+                      <a:r>
+                        <a:rPr lang="en-IN" sz="1600" u="none" strike="noStrike">
+                          <a:effectLst/>
+                        </a:rPr>
+                        <a:t>1.74592</a:t>
+                      </a:r>
+                      <a:endParaRPr lang="en-IN" sz="1600" b="0" i="0" u="none" strike="noStrike">
+                        <a:solidFill>
+                          <a:srgbClr val="000000"/>
+                        </a:solidFill>
+                        <a:effectLst/>
+                        <a:latin typeface="Calibri" panose="020F0502020204030204" pitchFamily="34" charset="0"/>
+                        <a:cs typeface="Calibri" panose="020F0502020204030204" pitchFamily="34" charset="0"/>
+                      </a:endParaRPr>
+                    </a:p>
+                  </a:txBody>
+                  <a:tcPr marL="9525" marR="9525" marT="9525" marB="0" anchor="b"/>
+                </a:tc>
+                <a:tc>
+                  <a:txBody>
+                    <a:bodyPr/>
+                    <a:lstStyle/>
+                    <a:p>
+                      <a:pPr algn="r" fontAlgn="b"/>
+                      <a:r>
+                        <a:rPr lang="en-IN" sz="1600" u="none" strike="noStrike">
+                          <a:effectLst/>
+                        </a:rPr>
+                        <a:t>98.25%</a:t>
+                      </a:r>
+                      <a:endParaRPr lang="en-IN" sz="1600" b="0" i="0" u="none" strike="noStrike">
+                        <a:solidFill>
+                          <a:srgbClr val="000000"/>
+                        </a:solidFill>
+                        <a:effectLst/>
+                        <a:latin typeface="Calibri" panose="020F0502020204030204" pitchFamily="34" charset="0"/>
+                        <a:cs typeface="Calibri" panose="020F0502020204030204" pitchFamily="34" charset="0"/>
+                      </a:endParaRPr>
+                    </a:p>
+                  </a:txBody>
+                  <a:tcPr marL="9525" marR="9525" marT="9525" marB="0" anchor="b"/>
+                </a:tc>
+                <a:tc>
+                  <a:txBody>
+                    <a:bodyPr/>
+                    <a:lstStyle/>
+                    <a:p>
+                      <a:pPr algn="r" fontAlgn="b"/>
+                      <a:r>
+                        <a:rPr lang="en-IN" sz="1600" u="none" strike="noStrike">
+                          <a:effectLst/>
+                        </a:rPr>
+                        <a:t>0.9941</a:t>
+                      </a:r>
+                      <a:endParaRPr lang="en-IN" sz="1600" b="0" i="0" u="none" strike="noStrike">
+                        <a:solidFill>
+                          <a:srgbClr val="000000"/>
+                        </a:solidFill>
+                        <a:effectLst/>
+                        <a:latin typeface="Calibri" panose="020F0502020204030204" pitchFamily="34" charset="0"/>
+                        <a:cs typeface="Calibri" panose="020F0502020204030204" pitchFamily="34" charset="0"/>
+                      </a:endParaRPr>
+                    </a:p>
+                  </a:txBody>
+                  <a:tcPr marL="9525" marR="9525" marT="9525" marB="0" anchor="b"/>
+                </a:tc>
+                <a:tc>
+                  <a:txBody>
+                    <a:bodyPr/>
+                    <a:lstStyle/>
+                    <a:p>
+                      <a:pPr algn="r" fontAlgn="b"/>
+                      <a:r>
+                        <a:rPr lang="en-IN" sz="1600" u="none" strike="noStrike" dirty="0">
+                          <a:effectLst/>
+                        </a:rPr>
+                        <a:t>0.9947</a:t>
+                      </a:r>
+                      <a:endParaRPr lang="en-IN" sz="1600" b="0" i="0" u="none" strike="noStrike" dirty="0">
+                        <a:solidFill>
+                          <a:srgbClr val="000000"/>
+                        </a:solidFill>
+                        <a:effectLst/>
+                        <a:latin typeface="Calibri" panose="020F0502020204030204" pitchFamily="34" charset="0"/>
+                        <a:cs typeface="Calibri" panose="020F0502020204030204" pitchFamily="34" charset="0"/>
+                      </a:endParaRPr>
+                    </a:p>
+                  </a:txBody>
+                  <a:tcPr marL="9525" marR="9525" marT="9525" marB="0" anchor="b"/>
+                </a:tc>
+                <a:extLst>
+                  <a:ext uri="{0D108BD9-81ED-4DB2-BD59-A6C34878D82A}">
+                    <a16:rowId xmlns:a16="http://schemas.microsoft.com/office/drawing/2014/main" val="1707972884"/>
+                  </a:ext>
+                </a:extLst>
+              </a:tr>
+            </a:tbl>
+          </a:graphicData>
+        </a:graphic>
+      </p:graphicFrame>
+      <p:sp>
+        <p:nvSpPr>
+          <p:cNvPr id="4" name="Slide Number Placeholder 3">
+            <a:extLst>
+              <a:ext uri="{FF2B5EF4-FFF2-40B4-BE49-F238E27FC236}">
+                <a16:creationId xmlns:a16="http://schemas.microsoft.com/office/drawing/2014/main" id="{67527B06-8BB6-DCB7-5146-EF44CC7B3780}"/>
+              </a:ext>
+            </a:extLst>
+          </p:cNvPr>
+          <p:cNvSpPr>
+            <a:spLocks noGrp="1"/>
+          </p:cNvSpPr>
+          <p:nvPr>
+            <p:ph type="sldNum" sz="quarter" idx="12"/>
+          </p:nvPr>
+        </p:nvSpPr>
+        <p:spPr/>
+        <p:txBody>
+          <a:bodyPr/>
+          <a:lstStyle/>
+          <a:p>
+            <a:fld id="{BB67B382-C0D7-E849-8D16-432A4E99B600}" type="slidenum">
+              <a:rPr lang="en-US" smtClean="0"/>
+              <a:t>12</a:t>
+            </a:fld>
+            <a:endParaRPr lang="en-US"/>
+          </a:p>
+        </p:txBody>
+      </p:sp>
+    </p:spTree>
+    <p:extLst>
+      <p:ext uri="{BB962C8B-B14F-4D97-AF65-F5344CB8AC3E}">
+        <p14:creationId xmlns:p14="http://schemas.microsoft.com/office/powerpoint/2010/main" val="1472567608"/>
+      </p:ext>
+    </p:extLst>
+  </p:cSld>
+  <p:clrMapOvr>
+    <a:masterClrMapping/>
+  </p:clrMapOvr>
+</p:sld>
+</file>
+
+<file path=ppt/slides/slide13.xml><?xml version="1.0" encoding="utf-8"?>
+<p:sld xmlns:a="http://schemas.openxmlformats.org/drawingml/2006/main" xmlns:r="http://schemas.openxmlformats.org/officeDocument/2006/relationships" xmlns:p="http://schemas.openxmlformats.org/presentationml/2006/main">
+  <p:cSld>
     <p:bg>
       <p:bgPr>
         <a:solidFill>
@@ -5882,7 +7107,7 @@
                   <a:spcPts val="600"/>
                 </a:spcAft>
               </a:pPr>
-              <a:t>12</a:t>
+              <a:t>13</a:t>
             </a:fld>
             <a:endParaRPr lang="en-US"/>
           </a:p>
@@ -5901,7 +7126,7 @@
 </p:sld>
 </file>
 
-<file path=ppt/slides/slide13.xml><?xml version="1.0" encoding="utf-8"?>
+<file path=ppt/slides/slide14.xml><?xml version="1.0" encoding="utf-8"?>
 <p:sld xmlns:a="http://schemas.openxmlformats.org/drawingml/2006/main" xmlns:r="http://schemas.openxmlformats.org/officeDocument/2006/relationships" xmlns:p="http://schemas.openxmlformats.org/presentationml/2006/main">
   <p:cSld>
     <p:bg>
@@ -6328,7 +7553,7 @@
                   <a:spcPts val="600"/>
                 </a:spcAft>
               </a:pPr>
-              <a:t>13</a:t>
+              <a:t>14</a:t>
             </a:fld>
             <a:endParaRPr lang="en-US"/>
           </a:p>
@@ -6347,7 +7572,7 @@
 </p:sld>
 </file>
 
-<file path=ppt/slides/slide14.xml><?xml version="1.0" encoding="utf-8"?>
+<file path=ppt/slides/slide15.xml><?xml version="1.0" encoding="utf-8"?>
 <p:sld xmlns:a="http://schemas.openxmlformats.org/drawingml/2006/main" xmlns:r="http://schemas.openxmlformats.org/officeDocument/2006/relationships" xmlns:p="http://schemas.openxmlformats.org/presentationml/2006/main">
   <p:cSld>
     <p:bg>
@@ -6762,7 +7987,7 @@
                   <a:spcPts val="600"/>
                 </a:spcAft>
               </a:pPr>
-              <a:t>14</a:t>
+              <a:t>15</a:t>
             </a:fld>
             <a:endParaRPr lang="en-US"/>
           </a:p>
@@ -6781,7 +8006,7 @@
 </p:sld>
 </file>
 
-<file path=ppt/slides/slide15.xml><?xml version="1.0" encoding="utf-8"?>
+<file path=ppt/slides/slide16.xml><?xml version="1.0" encoding="utf-8"?>
 <p:sld xmlns:a="http://schemas.openxmlformats.org/drawingml/2006/main" xmlns:r="http://schemas.openxmlformats.org/officeDocument/2006/relationships" xmlns:p="http://schemas.openxmlformats.org/presentationml/2006/main">
   <p:cSld>
     <p:spTree>
@@ -6888,7 +8113,7 @@
           <a:p>
             <a:fld id="{BB67B382-C0D7-E849-8D16-432A4E99B600}" type="slidenum">
               <a:rPr lang="en-US" smtClean="0"/>
-              <a:t>15</a:t>
+              <a:t>16</a:t>
             </a:fld>
             <a:endParaRPr lang="en-US"/>
           </a:p>
@@ -6907,7 +8132,7 @@
 </p:sld>
 </file>
 
-<file path=ppt/slides/slide16.xml><?xml version="1.0" encoding="utf-8"?>
+<file path=ppt/slides/slide17.xml><?xml version="1.0" encoding="utf-8"?>
 <p:sld xmlns:a="http://schemas.openxmlformats.org/drawingml/2006/main" xmlns:r="http://schemas.openxmlformats.org/officeDocument/2006/relationships" xmlns:p="http://schemas.openxmlformats.org/presentationml/2006/main">
   <p:cSld>
     <p:bg>
@@ -7873,7 +9098,7 @@
                   <a:spcPts val="600"/>
                 </a:spcAft>
               </a:pPr>
-              <a:t>16</a:t>
+              <a:t>17</a:t>
             </a:fld>
             <a:endParaRPr lang="en-US" sz="2800" b="1" kern="1200">
               <a:solidFill>

</xml_diff>